<commit_message>
Correção dos Artefatos 15 a 19 + 22 + 31
</commit_message>
<xml_diff>
--- a/Artefatos/15. Arquitetura de negócio para cada cenário.pptx
+++ b/Artefatos/15. Arquitetura de negócio para cada cenário.pptx
@@ -6712,7 +6712,7 @@
                 <a:cs typeface="Times New Roman"/>
                 <a:sym typeface="Times New Roman"/>
               </a:rPr>
-              <a:t>Negociação</a:t>
+              <a:t>Negociar</a:t>
             </a:r>
             <a:endParaRPr dirty="0">
               <a:latin typeface="Times New Roman"/>
@@ -7928,7 +7928,7 @@
                 <a:cs typeface="Times New Roman"/>
                 <a:sym typeface="Times New Roman"/>
               </a:rPr>
-              <a:t>Cenário: Negociação</a:t>
+              <a:t>Cenário: Negociar</a:t>
             </a:r>
             <a:endParaRPr sz="2000" b="1" dirty="0">
               <a:latin typeface="Times New Roman"/>
@@ -10603,7 +10603,7 @@
                 <a:cs typeface="Times New Roman"/>
                 <a:sym typeface="Times New Roman"/>
               </a:rPr>
-              <a:t>Cenário: negociação</a:t>
+              <a:t>Cenário: Negociar</a:t>
             </a:r>
             <a:endParaRPr sz="1700" b="1" dirty="0">
               <a:latin typeface="Times New Roman"/>

</xml_diff>

<commit_message>
Realização dos Artefatos 15, 16, 17, 18 de cada cenário.
</commit_message>
<xml_diff>
--- a/Artefatos/15. Arquitetura de negócio para cada cenário.pptx
+++ b/Artefatos/15. Arquitetura de negócio para cada cenário.pptx
@@ -6599,7 +6599,7 @@
         </p:nvSpPr>
         <p:spPr>
           <a:xfrm>
-            <a:off x="2310425" y="2342626"/>
+            <a:off x="2310425" y="965575"/>
             <a:ext cx="2292300" cy="1441079"/>
           </a:xfrm>
           <a:prstGeom prst="rect">
@@ -6664,12 +6664,22 @@
               </a:rPr>
               <a:t>Assistir Aula</a:t>
             </a:r>
-            <a:endParaRPr dirty="0">
-              <a:latin typeface="Times New Roman"/>
-              <a:ea typeface="Times New Roman"/>
-              <a:cs typeface="Times New Roman"/>
-              <a:sym typeface="Times New Roman"/>
-            </a:endParaRPr>
+          </a:p>
+          <a:p>
+            <a:pPr marL="457200" indent="-317500" algn="just">
+              <a:buSzPts val="1400"/>
+              <a:buFont typeface="Times New Roman"/>
+              <a:buAutoNum type="arabicPeriod"/>
+            </a:pPr>
+            <a:r>
+              <a:rPr lang="pt-BR" dirty="0">
+                <a:latin typeface="Times New Roman"/>
+                <a:ea typeface="Times New Roman"/>
+                <a:cs typeface="Times New Roman"/>
+                <a:sym typeface="Times New Roman"/>
+              </a:rPr>
+              <a:t>Negociar</a:t>
+            </a:r>
           </a:p>
           <a:p>
             <a:pPr marL="457200" lvl="0" indent="-317500" algn="just" rtl="0">
@@ -6692,34 +6702,6 @@
               </a:rPr>
               <a:t>Trancar Matrícula</a:t>
             </a:r>
-          </a:p>
-          <a:p>
-            <a:pPr marL="457200" lvl="0" indent="-317500" algn="just" rtl="0">
-              <a:spcBef>
-                <a:spcPts val="0"/>
-              </a:spcBef>
-              <a:spcAft>
-                <a:spcPts val="0"/>
-              </a:spcAft>
-              <a:buSzPts val="1400"/>
-              <a:buFont typeface="Times New Roman"/>
-              <a:buAutoNum type="arabicPeriod"/>
-            </a:pPr>
-            <a:r>
-              <a:rPr lang="pt-BR" dirty="0">
-                <a:latin typeface="Times New Roman"/>
-                <a:ea typeface="Times New Roman"/>
-                <a:cs typeface="Times New Roman"/>
-                <a:sym typeface="Times New Roman"/>
-              </a:rPr>
-              <a:t>Negociar</a:t>
-            </a:r>
-            <a:endParaRPr dirty="0">
-              <a:latin typeface="Times New Roman"/>
-              <a:ea typeface="Times New Roman"/>
-              <a:cs typeface="Times New Roman"/>
-              <a:sym typeface="Times New Roman"/>
-            </a:endParaRPr>
           </a:p>
           <a:p>
             <a:pPr marL="457200" lvl="0" indent="-317500" algn="just" rtl="0">

</xml_diff>